<commit_message>
modeling/behavior/sd: fix typo p -> prototype
</commit_message>
<xml_diff>
--- a/diagrams/modelling/modellingBehaviours/sequenceDiagramsBasic/Machine.pptx
+++ b/diagrams/modelling/modellingBehaviours/sequenceDiagramsBasic/Machine.pptx
@@ -304,7 +304,7 @@
           <a:p>
             <a:fld id="{5C63EA63-0159-4067-AC1E-0A923D89E69F}" type="datetimeFigureOut">
               <a:rPr lang="en-SG" smtClean="0"/>
-              <a:t>12/9/2017</a:t>
+              <a:t>22/11/2017</a:t>
             </a:fld>
             <a:endParaRPr lang="en-SG"/>
           </a:p>
@@ -474,7 +474,7 @@
           <a:p>
             <a:fld id="{5C63EA63-0159-4067-AC1E-0A923D89E69F}" type="datetimeFigureOut">
               <a:rPr lang="en-SG" smtClean="0"/>
-              <a:t>12/9/2017</a:t>
+              <a:t>22/11/2017</a:t>
             </a:fld>
             <a:endParaRPr lang="en-SG"/>
           </a:p>
@@ -654,7 +654,7 @@
           <a:p>
             <a:fld id="{5C63EA63-0159-4067-AC1E-0A923D89E69F}" type="datetimeFigureOut">
               <a:rPr lang="en-SG" smtClean="0"/>
-              <a:t>12/9/2017</a:t>
+              <a:t>22/11/2017</a:t>
             </a:fld>
             <a:endParaRPr lang="en-SG"/>
           </a:p>
@@ -824,7 +824,7 @@
           <a:p>
             <a:fld id="{5C63EA63-0159-4067-AC1E-0A923D89E69F}" type="datetimeFigureOut">
               <a:rPr lang="en-SG" smtClean="0"/>
-              <a:t>12/9/2017</a:t>
+              <a:t>22/11/2017</a:t>
             </a:fld>
             <a:endParaRPr lang="en-SG"/>
           </a:p>
@@ -1070,7 +1070,7 @@
           <a:p>
             <a:fld id="{5C63EA63-0159-4067-AC1E-0A923D89E69F}" type="datetimeFigureOut">
               <a:rPr lang="en-SG" smtClean="0"/>
-              <a:t>12/9/2017</a:t>
+              <a:t>22/11/2017</a:t>
             </a:fld>
             <a:endParaRPr lang="en-SG"/>
           </a:p>
@@ -1358,7 +1358,7 @@
           <a:p>
             <a:fld id="{5C63EA63-0159-4067-AC1E-0A923D89E69F}" type="datetimeFigureOut">
               <a:rPr lang="en-SG" smtClean="0"/>
-              <a:t>12/9/2017</a:t>
+              <a:t>22/11/2017</a:t>
             </a:fld>
             <a:endParaRPr lang="en-SG"/>
           </a:p>
@@ -1780,7 +1780,7 @@
           <a:p>
             <a:fld id="{5C63EA63-0159-4067-AC1E-0A923D89E69F}" type="datetimeFigureOut">
               <a:rPr lang="en-SG" smtClean="0"/>
-              <a:t>12/9/2017</a:t>
+              <a:t>22/11/2017</a:t>
             </a:fld>
             <a:endParaRPr lang="en-SG"/>
           </a:p>
@@ -1898,7 +1898,7 @@
           <a:p>
             <a:fld id="{5C63EA63-0159-4067-AC1E-0A923D89E69F}" type="datetimeFigureOut">
               <a:rPr lang="en-SG" smtClean="0"/>
-              <a:t>12/9/2017</a:t>
+              <a:t>22/11/2017</a:t>
             </a:fld>
             <a:endParaRPr lang="en-SG"/>
           </a:p>
@@ -1993,7 +1993,7 @@
           <a:p>
             <a:fld id="{5C63EA63-0159-4067-AC1E-0A923D89E69F}" type="datetimeFigureOut">
               <a:rPr lang="en-SG" smtClean="0"/>
-              <a:t>12/9/2017</a:t>
+              <a:t>22/11/2017</a:t>
             </a:fld>
             <a:endParaRPr lang="en-SG"/>
           </a:p>
@@ -2270,7 +2270,7 @@
           <a:p>
             <a:fld id="{5C63EA63-0159-4067-AC1E-0A923D89E69F}" type="datetimeFigureOut">
               <a:rPr lang="en-SG" smtClean="0"/>
-              <a:t>12/9/2017</a:t>
+              <a:t>22/11/2017</a:t>
             </a:fld>
             <a:endParaRPr lang="en-SG"/>
           </a:p>
@@ -2523,7 +2523,7 @@
           <a:p>
             <a:fld id="{5C63EA63-0159-4067-AC1E-0A923D89E69F}" type="datetimeFigureOut">
               <a:rPr lang="en-SG" smtClean="0"/>
-              <a:t>12/9/2017</a:t>
+              <a:t>22/11/2017</a:t>
             </a:fld>
             <a:endParaRPr lang="en-SG"/>
           </a:p>
@@ -2736,7 +2736,7 @@
           <a:p>
             <a:fld id="{5C63EA63-0159-4067-AC1E-0A923D89E69F}" type="datetimeFigureOut">
               <a:rPr lang="en-SG" smtClean="0"/>
-              <a:t>12/9/2017</a:t>
+              <a:t>22/11/2017</a:t>
             </a:fld>
             <a:endParaRPr lang="en-SG"/>
           </a:p>
@@ -3469,8 +3469,8 @@
         </p:nvSpPr>
         <p:spPr bwMode="auto">
           <a:xfrm>
-            <a:off x="2614818" y="4158968"/>
-            <a:ext cx="343960" cy="400110"/>
+            <a:off x="1907704" y="4158968"/>
+            <a:ext cx="1224136" cy="400110"/>
           </a:xfrm>
           <a:prstGeom prst="rect">
             <a:avLst/>
@@ -3498,7 +3498,7 @@
             </a:pPr>
             <a:r>
               <a:rPr lang="en-US" sz="2000" dirty="0" smtClean="0"/>
-              <a:t>p</a:t>
+              <a:t>prototype</a:t>
             </a:r>
             <a:endParaRPr lang="en-US" sz="2000" dirty="0"/>
           </a:p>
@@ -4206,20 +4206,12 @@
               <a:buNone/>
             </a:pPr>
             <a:r>
-              <a:rPr lang="en-US" sz="2000" dirty="0" smtClean="0">
+              <a:rPr lang="en-US" sz="2000" dirty="0" err="1" smtClean="0">
                 <a:solidFill>
                   <a:schemeClr val="tx1"/>
                 </a:solidFill>
               </a:rPr>
-              <a:t>p</a:t>
-            </a:r>
-            <a:r>
-              <a:rPr lang="en-US" sz="2000" dirty="0" smtClean="0">
-                <a:solidFill>
-                  <a:schemeClr val="tx1"/>
-                </a:solidFill>
-              </a:rPr>
-              <a:t>:Unit</a:t>
+              <a:t>prototype:Unit</a:t>
             </a:r>
             <a:endParaRPr lang="en-US" sz="2000" dirty="0">
               <a:solidFill>
@@ -4273,51 +4265,6 @@
             <a:r>
               <a:rPr lang="en-US" sz="2000" dirty="0" smtClean="0"/>
               <a:t>()</a:t>
-            </a:r>
-            <a:endParaRPr lang="en-US" sz="2000" dirty="0"/>
-          </a:p>
-        </p:txBody>
-      </p:sp>
-      <p:sp>
-        <p:nvSpPr>
-          <p:cNvPr id="40" name="Text Box 25"/>
-          <p:cNvSpPr txBox="1">
-            <a:spLocks noChangeArrowheads="1"/>
-          </p:cNvSpPr>
-          <p:nvPr/>
-        </p:nvSpPr>
-        <p:spPr bwMode="auto">
-          <a:xfrm>
-            <a:off x="5476498" y="3720812"/>
-            <a:ext cx="343960" cy="400110"/>
-          </a:xfrm>
-          <a:prstGeom prst="rect">
-            <a:avLst/>
-          </a:prstGeom>
-          <a:noFill/>
-          <a:ln w="12700" algn="ctr">
-            <a:noFill/>
-            <a:miter lim="800000"/>
-            <a:headEnd/>
-            <a:tailEnd/>
-          </a:ln>
-        </p:spPr>
-        <p:txBody>
-          <a:bodyPr wrap="square">
-            <a:spAutoFit/>
-          </a:bodyPr>
-          <a:lstStyle/>
-          <a:p>
-            <a:pPr>
-              <a:spcBef>
-                <a:spcPct val="50000"/>
-              </a:spcBef>
-              <a:buFont typeface="Wingdings" pitchFamily="2" charset="2"/>
-              <a:buNone/>
-            </a:pPr>
-            <a:r>
-              <a:rPr lang="en-US" sz="2000" dirty="0" smtClean="0"/>
-              <a:t>p</a:t>
             </a:r>
             <a:endParaRPr lang="en-US" sz="2000" dirty="0"/>
           </a:p>
@@ -5100,33 +5047,6 @@
                                   </p:childTnLst>
                                 </p:cTn>
                               </p:par>
-                              <p:par>
-                                <p:cTn id="61" presetID="1" presetClass="exit" presetSubtype="0" fill="hold" grpId="0" nodeType="withEffect">
-                                  <p:stCondLst>
-                                    <p:cond delay="0"/>
-                                  </p:stCondLst>
-                                  <p:childTnLst>
-                                    <p:set>
-                                      <p:cBhvr>
-                                        <p:cTn id="62" dur="1" fill="hold">
-                                          <p:stCondLst>
-                                            <p:cond delay="0"/>
-                                          </p:stCondLst>
-                                        </p:cTn>
-                                        <p:tgtEl>
-                                          <p:spTgt spid="40"/>
-                                        </p:tgtEl>
-                                        <p:attrNameLst>
-                                          <p:attrName>style.visibility</p:attrName>
-                                        </p:attrNameLst>
-                                      </p:cBhvr>
-                                      <p:to>
-                                        <p:strVal val="hidden"/>
-                                      </p:to>
-                                    </p:set>
-                                  </p:childTnLst>
-                                </p:cTn>
-                              </p:par>
                             </p:childTnLst>
                           </p:cTn>
                         </p:par>
@@ -5182,7 +5102,6 @@
       <p:bldP spid="36" grpId="1"/>
       <p:bldP spid="38" grpId="0" animBg="1"/>
       <p:bldP spid="39" grpId="0"/>
-      <p:bldP spid="40" grpId="0"/>
     </p:bldLst>
   </p:timing>
 </p:sld>

</xml_diff>